<commit_message>
More updates? More updates
</commit_message>
<xml_diff>
--- a/Docs/ThesisPresentation.pptx
+++ b/Docs/ThesisPresentation.pptx
@@ -33,6 +33,8 @@
     <p:sldId id="280" r:id="rId27"/>
     <p:sldId id="281" r:id="rId28"/>
     <p:sldId id="283" r:id="rId29"/>
+    <p:sldId id="284" r:id="rId30"/>
+    <p:sldId id="285" r:id="rId31"/>
   </p:sldIdLst>
   <p:sldSz cx="12192000" cy="6858000"/>
   <p:notesSz cx="6858000" cy="9144000"/>
@@ -131,6 +133,11 @@
       </a:defRPr>
     </a:lvl9pPr>
   </p:defaultTextStyle>
+  <p:extLst>
+    <p:ext uri="{EFAFB233-063F-42B5-8137-9DF3F51BA10A}">
+      <p15:sldGuideLst xmlns:p15="http://schemas.microsoft.com/office/powerpoint/2012/main"/>
+    </p:ext>
+  </p:extLst>
 </p:presentation>
 </file>
 
@@ -859,7 +866,7 @@
             <a:fld id="{B61BEF0D-F0BB-DE4B-95CE-6DB70DBA9567}" type="datetimeFigureOut">
               <a:rPr lang="en-US" dirty="0"/>
               <a:pPr/>
-              <a:t>4/17/2017</a:t>
+              <a:t>4/18/2017</a:t>
             </a:fld>
             <a:endParaRPr lang="en-US" dirty="0"/>
           </a:p>
@@ -1107,7 +1114,7 @@
             <a:fld id="{B61BEF0D-F0BB-DE4B-95CE-6DB70DBA9567}" type="datetimeFigureOut">
               <a:rPr lang="en-US" dirty="0"/>
               <a:pPr/>
-              <a:t>4/17/2017</a:t>
+              <a:t>4/18/2017</a:t>
             </a:fld>
             <a:endParaRPr lang="en-US" dirty="0"/>
           </a:p>
@@ -1418,7 +1425,7 @@
             <a:fld id="{B61BEF0D-F0BB-DE4B-95CE-6DB70DBA9567}" type="datetimeFigureOut">
               <a:rPr lang="en-US" dirty="0"/>
               <a:pPr/>
-              <a:t>4/17/2017</a:t>
+              <a:t>4/18/2017</a:t>
             </a:fld>
             <a:endParaRPr lang="en-US" dirty="0"/>
           </a:p>
@@ -1742,7 +1749,7 @@
             <a:fld id="{B61BEF0D-F0BB-DE4B-95CE-6DB70DBA9567}" type="datetimeFigureOut">
               <a:rPr lang="en-US" dirty="0"/>
               <a:pPr/>
-              <a:t>4/17/2017</a:t>
+              <a:t>4/18/2017</a:t>
             </a:fld>
             <a:endParaRPr lang="en-US" dirty="0"/>
           </a:p>
@@ -2053,7 +2060,7 @@
             <a:fld id="{B61BEF0D-F0BB-DE4B-95CE-6DB70DBA9567}" type="datetimeFigureOut">
               <a:rPr lang="en-US" dirty="0"/>
               <a:pPr/>
-              <a:t>4/17/2017</a:t>
+              <a:t>4/18/2017</a:t>
             </a:fld>
             <a:endParaRPr lang="en-US" dirty="0"/>
           </a:p>
@@ -2437,7 +2444,7 @@
             <a:fld id="{B61BEF0D-F0BB-DE4B-95CE-6DB70DBA9567}" type="datetimeFigureOut">
               <a:rPr lang="en-US" dirty="0"/>
               <a:pPr/>
-              <a:t>4/17/2017</a:t>
+              <a:t>4/18/2017</a:t>
             </a:fld>
             <a:endParaRPr lang="en-US" dirty="0"/>
           </a:p>
@@ -2603,7 +2610,7 @@
           <a:p>
             <a:fld id="{55C6B4A9-1611-4792-9094-5F34BCA07E0B}" type="datetimeFigureOut">
               <a:rPr lang="en-US" dirty="0"/>
-              <a:t>4/17/2017</a:t>
+              <a:t>4/18/2017</a:t>
             </a:fld>
             <a:endParaRPr lang="en-US" dirty="0"/>
           </a:p>
@@ -2779,7 +2786,7 @@
             <a:fld id="{B61BEF0D-F0BB-DE4B-95CE-6DB70DBA9567}" type="datetimeFigureOut">
               <a:rPr lang="en-US" dirty="0"/>
               <a:pPr/>
-              <a:t>4/17/2017</a:t>
+              <a:t>4/18/2017</a:t>
             </a:fld>
             <a:endParaRPr lang="en-US" dirty="0"/>
           </a:p>
@@ -2952,7 +2959,7 @@
             <a:fld id="{B61BEF0D-F0BB-DE4B-95CE-6DB70DBA9567}" type="datetimeFigureOut">
               <a:rPr lang="en-US" dirty="0"/>
               <a:pPr/>
-              <a:t>4/17/2017</a:t>
+              <a:t>4/18/2017</a:t>
             </a:fld>
             <a:endParaRPr lang="en-US" dirty="0"/>
           </a:p>
@@ -3196,7 +3203,7 @@
             <a:fld id="{B61BEF0D-F0BB-DE4B-95CE-6DB70DBA9567}" type="datetimeFigureOut">
               <a:rPr lang="en-US" dirty="0"/>
               <a:pPr/>
-              <a:t>4/17/2017</a:t>
+              <a:t>4/18/2017</a:t>
             </a:fld>
             <a:endParaRPr lang="en-US" dirty="0"/>
           </a:p>
@@ -3424,7 +3431,7 @@
           <a:p>
             <a:fld id="{EB712588-04B1-427B-82EE-E8DB90309F08}" type="datetimeFigureOut">
               <a:rPr lang="en-US" dirty="0"/>
-              <a:t>4/17/2017</a:t>
+              <a:t>4/18/2017</a:t>
             </a:fld>
             <a:endParaRPr lang="en-US" dirty="0"/>
           </a:p>
@@ -3794,7 +3801,7 @@
             <a:fld id="{B61BEF0D-F0BB-DE4B-95CE-6DB70DBA9567}" type="datetimeFigureOut">
               <a:rPr lang="en-US" dirty="0"/>
               <a:pPr/>
-              <a:t>4/17/2017</a:t>
+              <a:t>4/18/2017</a:t>
             </a:fld>
             <a:endParaRPr lang="en-US" dirty="0"/>
           </a:p>
@@ -3914,7 +3921,7 @@
             <a:fld id="{B61BEF0D-F0BB-DE4B-95CE-6DB70DBA9567}" type="datetimeFigureOut">
               <a:rPr lang="en-US" dirty="0"/>
               <a:pPr/>
-              <a:t>4/17/2017</a:t>
+              <a:t>4/18/2017</a:t>
             </a:fld>
             <a:endParaRPr lang="en-US" dirty="0"/>
           </a:p>
@@ -4006,7 +4013,7 @@
             <a:fld id="{B61BEF0D-F0BB-DE4B-95CE-6DB70DBA9567}" type="datetimeFigureOut">
               <a:rPr lang="en-US" dirty="0"/>
               <a:pPr/>
-              <a:t>4/17/2017</a:t>
+              <a:t>4/18/2017</a:t>
             </a:fld>
             <a:endParaRPr lang="en-US" dirty="0"/>
           </a:p>
@@ -4257,7 +4264,7 @@
           <a:p>
             <a:fld id="{42A54C80-263E-416B-A8E0-580EDEADCBDC}" type="datetimeFigureOut">
               <a:rPr lang="en-US" dirty="0"/>
-              <a:t>4/17/2017</a:t>
+              <a:t>4/18/2017</a:t>
             </a:fld>
             <a:endParaRPr lang="en-US" dirty="0"/>
           </a:p>
@@ -4516,7 +4523,7 @@
             <a:fld id="{B61BEF0D-F0BB-DE4B-95CE-6DB70DBA9567}" type="datetimeFigureOut">
               <a:rPr lang="en-US" dirty="0"/>
               <a:pPr/>
-              <a:t>4/17/2017</a:t>
+              <a:t>4/18/2017</a:t>
             </a:fld>
             <a:endParaRPr lang="en-US" dirty="0"/>
           </a:p>
@@ -5258,7 +5265,7 @@
             <a:fld id="{B61BEF0D-F0BB-DE4B-95CE-6DB70DBA9567}" type="datetimeFigureOut">
               <a:rPr lang="en-US" dirty="0"/>
               <a:pPr/>
-              <a:t>4/17/2017</a:t>
+              <a:t>4/18/2017</a:t>
             </a:fld>
             <a:endParaRPr lang="en-US" dirty="0"/>
           </a:p>
@@ -5797,7 +5804,6 @@
               <a:rPr lang="en-US" dirty="0"/>
               <a:t>Creating a Competitive Multiplayer Open-Arena 2D Twin-Stick Shooter</a:t>
             </a:r>
-            <a:endParaRPr lang="en-US" dirty="0"/>
           </a:p>
         </p:txBody>
       </p:sp>
@@ -7267,8 +7273,12 @@
           <a:p>
             <a:r>
               <a:rPr lang="en-US" dirty="0"/>
-              <a:t>Multiplayer</a:t>
-            </a:r>
+              <a:t>Trails</a:t>
+            </a:r>
+            <a:br>
+              <a:rPr lang="en-US" dirty="0"/>
+            </a:br>
+            <a:endParaRPr lang="en-US" dirty="0"/>
           </a:p>
         </p:txBody>
       </p:sp>
@@ -7295,6 +7305,81 @@
     <p:extLst>
       <p:ext uri="{BB962C8B-B14F-4D97-AF65-F5344CB8AC3E}">
         <p14:creationId xmlns:p14="http://schemas.microsoft.com/office/powerpoint/2010/main" val="141169460"/>
+      </p:ext>
+    </p:extLst>
+  </p:cSld>
+  <p:clrMapOvr>
+    <a:masterClrMapping/>
+  </p:clrMapOvr>
+</p:sld>
+</file>
+
+<file path=ppt/slides/slide29.xml><?xml version="1.0" encoding="utf-8"?>
+<p:sld xmlns:a="http://schemas.openxmlformats.org/drawingml/2006/main" xmlns:r="http://schemas.openxmlformats.org/officeDocument/2006/relationships" xmlns:p="http://schemas.openxmlformats.org/presentationml/2006/main">
+  <p:cSld>
+    <p:spTree>
+      <p:nvGrpSpPr>
+        <p:cNvPr id="1" name=""/>
+        <p:cNvGrpSpPr/>
+        <p:nvPr/>
+      </p:nvGrpSpPr>
+      <p:grpSpPr>
+        <a:xfrm>
+          <a:off x="0" y="0"/>
+          <a:ext cx="0" cy="0"/>
+          <a:chOff x="0" y="0"/>
+          <a:chExt cx="0" cy="0"/>
+        </a:xfrm>
+      </p:grpSpPr>
+      <p:sp>
+        <p:nvSpPr>
+          <p:cNvPr id="2" name="Title 1"/>
+          <p:cNvSpPr>
+            <a:spLocks noGrp="1"/>
+          </p:cNvSpPr>
+          <p:nvPr>
+            <p:ph type="title"/>
+          </p:nvPr>
+        </p:nvSpPr>
+        <p:spPr/>
+        <p:txBody>
+          <a:bodyPr/>
+          <a:lstStyle/>
+          <a:p>
+            <a:r>
+              <a:rPr lang="en-US" dirty="0"/>
+              <a:t>Results Background FBO</a:t>
+            </a:r>
+            <a:br>
+              <a:rPr lang="en-US" dirty="0"/>
+            </a:br>
+            <a:endParaRPr lang="en-US" dirty="0"/>
+          </a:p>
+        </p:txBody>
+      </p:sp>
+      <p:sp>
+        <p:nvSpPr>
+          <p:cNvPr id="3" name="Content Placeholder 2"/>
+          <p:cNvSpPr>
+            <a:spLocks noGrp="1"/>
+          </p:cNvSpPr>
+          <p:nvPr>
+            <p:ph idx="1"/>
+          </p:nvPr>
+        </p:nvSpPr>
+        <p:spPr/>
+        <p:txBody>
+          <a:bodyPr/>
+          <a:lstStyle/>
+          <a:p>
+            <a:endParaRPr lang="en-US"/>
+          </a:p>
+        </p:txBody>
+      </p:sp>
+    </p:spTree>
+    <p:extLst>
+      <p:ext uri="{BB962C8B-B14F-4D97-AF65-F5344CB8AC3E}">
+        <p14:creationId xmlns:p14="http://schemas.microsoft.com/office/powerpoint/2010/main" val="1043168109"/>
       </p:ext>
     </p:extLst>
   </p:cSld>
@@ -7366,6 +7451,81 @@
     <p:extLst>
       <p:ext uri="{BB962C8B-B14F-4D97-AF65-F5344CB8AC3E}">
         <p14:creationId xmlns:p14="http://schemas.microsoft.com/office/powerpoint/2010/main" val="2672661245"/>
+      </p:ext>
+    </p:extLst>
+  </p:cSld>
+  <p:clrMapOvr>
+    <a:masterClrMapping/>
+  </p:clrMapOvr>
+</p:sld>
+</file>
+
+<file path=ppt/slides/slide30.xml><?xml version="1.0" encoding="utf-8"?>
+<p:sld xmlns:a="http://schemas.openxmlformats.org/drawingml/2006/main" xmlns:r="http://schemas.openxmlformats.org/officeDocument/2006/relationships" xmlns:p="http://schemas.openxmlformats.org/presentationml/2006/main">
+  <p:cSld>
+    <p:spTree>
+      <p:nvGrpSpPr>
+        <p:cNvPr id="1" name=""/>
+        <p:cNvGrpSpPr/>
+        <p:nvPr/>
+      </p:nvGrpSpPr>
+      <p:grpSpPr>
+        <a:xfrm>
+          <a:off x="0" y="0"/>
+          <a:ext cx="0" cy="0"/>
+          <a:chOff x="0" y="0"/>
+          <a:chExt cx="0" cy="0"/>
+        </a:xfrm>
+      </p:grpSpPr>
+      <p:sp>
+        <p:nvSpPr>
+          <p:cNvPr id="2" name="Title 1"/>
+          <p:cNvSpPr>
+            <a:spLocks noGrp="1"/>
+          </p:cNvSpPr>
+          <p:nvPr>
+            <p:ph type="title"/>
+          </p:nvPr>
+        </p:nvSpPr>
+        <p:spPr/>
+        <p:txBody>
+          <a:bodyPr/>
+          <a:lstStyle/>
+          <a:p>
+            <a:r>
+              <a:rPr lang="en-US"/>
+              <a:t>Bloom</a:t>
+            </a:r>
+            <a:br>
+              <a:rPr lang="en-US" dirty="0"/>
+            </a:br>
+            <a:endParaRPr lang="en-US" dirty="0"/>
+          </a:p>
+        </p:txBody>
+      </p:sp>
+      <p:sp>
+        <p:nvSpPr>
+          <p:cNvPr id="3" name="Content Placeholder 2"/>
+          <p:cNvSpPr>
+            <a:spLocks noGrp="1"/>
+          </p:cNvSpPr>
+          <p:nvPr>
+            <p:ph idx="1"/>
+          </p:nvPr>
+        </p:nvSpPr>
+        <p:spPr/>
+        <p:txBody>
+          <a:bodyPr/>
+          <a:lstStyle/>
+          <a:p>
+            <a:endParaRPr lang="en-US"/>
+          </a:p>
+        </p:txBody>
+      </p:sp>
+    </p:spTree>
+    <p:extLst>
+      <p:ext uri="{BB962C8B-B14F-4D97-AF65-F5344CB8AC3E}">
+        <p14:creationId xmlns:p14="http://schemas.microsoft.com/office/powerpoint/2010/main" val="2610843480"/>
       </p:ext>
     </p:extLst>
   </p:cSld>

</xml_diff>